<commit_message>
feat: Sistema LightGBM listo para producción - MAE 8.37 µg/m³
</commit_message>
<xml_diff>
--- a/diseno/mock_ups.pptx
+++ b/diseno/mock_ups.pptx
@@ -7,6 +7,11 @@
   <p:sldIdLst>
     <p:sldId id="256" r:id="rId2"/>
     <p:sldId id="257" r:id="rId3"/>
+    <p:sldId id="258" r:id="rId4"/>
+    <p:sldId id="259" r:id="rId5"/>
+    <p:sldId id="260" r:id="rId6"/>
+    <p:sldId id="261" r:id="rId7"/>
+    <p:sldId id="262" r:id="rId8"/>
   </p:sldIdLst>
   <p:sldSz cx="12192000" cy="6858000"/>
   <p:notesSz cx="6858000" cy="9144000"/>
@@ -105,6 +110,11 @@
       </a:defRPr>
     </a:lvl9pPr>
   </p:defaultTextStyle>
+  <p:extLst>
+    <p:ext uri="{EFAFB233-063F-42B5-8137-9DF3F51BA10A}">
+      <p15:sldGuideLst xmlns:p15="http://schemas.microsoft.com/office/powerpoint/2012/main"/>
+    </p:ext>
+  </p:extLst>
 </p:presentation>
 </file>
 
@@ -255,7 +265,7 @@
           <a:p>
             <a:fld id="{08A6B3F5-27C3-D846-9255-95F5B4889960}" type="datetimeFigureOut">
               <a:rPr lang="es-ES" smtClean="0"/>
-              <a:t>1/6/25</a:t>
+              <a:t>2/6/25</a:t>
             </a:fld>
             <a:endParaRPr lang="es-ES"/>
           </a:p>
@@ -453,7 +463,7 @@
           <a:p>
             <a:fld id="{08A6B3F5-27C3-D846-9255-95F5B4889960}" type="datetimeFigureOut">
               <a:rPr lang="es-ES" smtClean="0"/>
-              <a:t>1/6/25</a:t>
+              <a:t>2/6/25</a:t>
             </a:fld>
             <a:endParaRPr lang="es-ES"/>
           </a:p>
@@ -661,7 +671,7 @@
           <a:p>
             <a:fld id="{08A6B3F5-27C3-D846-9255-95F5B4889960}" type="datetimeFigureOut">
               <a:rPr lang="es-ES" smtClean="0"/>
-              <a:t>1/6/25</a:t>
+              <a:t>2/6/25</a:t>
             </a:fld>
             <a:endParaRPr lang="es-ES"/>
           </a:p>
@@ -859,7 +869,7 @@
           <a:p>
             <a:fld id="{08A6B3F5-27C3-D846-9255-95F5B4889960}" type="datetimeFigureOut">
               <a:rPr lang="es-ES" smtClean="0"/>
-              <a:t>1/6/25</a:t>
+              <a:t>2/6/25</a:t>
             </a:fld>
             <a:endParaRPr lang="es-ES"/>
           </a:p>
@@ -1134,7 +1144,7 @@
           <a:p>
             <a:fld id="{08A6B3F5-27C3-D846-9255-95F5B4889960}" type="datetimeFigureOut">
               <a:rPr lang="es-ES" smtClean="0"/>
-              <a:t>1/6/25</a:t>
+              <a:t>2/6/25</a:t>
             </a:fld>
             <a:endParaRPr lang="es-ES"/>
           </a:p>
@@ -1399,7 +1409,7 @@
           <a:p>
             <a:fld id="{08A6B3F5-27C3-D846-9255-95F5B4889960}" type="datetimeFigureOut">
               <a:rPr lang="es-ES" smtClean="0"/>
-              <a:t>1/6/25</a:t>
+              <a:t>2/6/25</a:t>
             </a:fld>
             <a:endParaRPr lang="es-ES"/>
           </a:p>
@@ -1811,7 +1821,7 @@
           <a:p>
             <a:fld id="{08A6B3F5-27C3-D846-9255-95F5B4889960}" type="datetimeFigureOut">
               <a:rPr lang="es-ES" smtClean="0"/>
-              <a:t>1/6/25</a:t>
+              <a:t>2/6/25</a:t>
             </a:fld>
             <a:endParaRPr lang="es-ES"/>
           </a:p>
@@ -1952,7 +1962,7 @@
           <a:p>
             <a:fld id="{08A6B3F5-27C3-D846-9255-95F5B4889960}" type="datetimeFigureOut">
               <a:rPr lang="es-ES" smtClean="0"/>
-              <a:t>1/6/25</a:t>
+              <a:t>2/6/25</a:t>
             </a:fld>
             <a:endParaRPr lang="es-ES"/>
           </a:p>
@@ -2065,7 +2075,7 @@
           <a:p>
             <a:fld id="{08A6B3F5-27C3-D846-9255-95F5B4889960}" type="datetimeFigureOut">
               <a:rPr lang="es-ES" smtClean="0"/>
-              <a:t>1/6/25</a:t>
+              <a:t>2/6/25</a:t>
             </a:fld>
             <a:endParaRPr lang="es-ES"/>
           </a:p>
@@ -2376,7 +2386,7 @@
           <a:p>
             <a:fld id="{08A6B3F5-27C3-D846-9255-95F5B4889960}" type="datetimeFigureOut">
               <a:rPr lang="es-ES" smtClean="0"/>
-              <a:t>1/6/25</a:t>
+              <a:t>2/6/25</a:t>
             </a:fld>
             <a:endParaRPr lang="es-ES"/>
           </a:p>
@@ -2664,7 +2674,7 @@
           <a:p>
             <a:fld id="{08A6B3F5-27C3-D846-9255-95F5B4889960}" type="datetimeFigureOut">
               <a:rPr lang="es-ES" smtClean="0"/>
-              <a:t>1/6/25</a:t>
+              <a:t>2/6/25</a:t>
             </a:fld>
             <a:endParaRPr lang="es-ES"/>
           </a:p>
@@ -2905,7 +2915,7 @@
           <a:p>
             <a:fld id="{08A6B3F5-27C3-D846-9255-95F5B4889960}" type="datetimeFigureOut">
               <a:rPr lang="es-ES" smtClean="0"/>
-              <a:t>1/6/25</a:t>
+              <a:t>2/6/25</a:t>
             </a:fld>
             <a:endParaRPr lang="es-ES"/>
           </a:p>
@@ -3462,12 +3472,109 @@
           </a:prstGeom>
         </p:spPr>
       </p:pic>
-      <p:sp>
-        <p:nvSpPr>
-          <p:cNvPr id="9" name="CuadroTexto 8">
-            <a:extLst>
-              <a:ext uri="{FF2B5EF4-FFF2-40B4-BE49-F238E27FC236}">
-                <a16:creationId xmlns:a16="http://schemas.microsoft.com/office/drawing/2014/main" id="{17EFDAB9-7370-57FC-C814-016D7967953A}"/>
+    </p:spTree>
+    <p:extLst>
+      <p:ext uri="{BB962C8B-B14F-4D97-AF65-F5344CB8AC3E}">
+        <p14:creationId xmlns:p14="http://schemas.microsoft.com/office/powerpoint/2010/main" val="1753184298"/>
+      </p:ext>
+    </p:extLst>
+  </p:cSld>
+  <p:clrMapOvr>
+    <a:masterClrMapping/>
+  </p:clrMapOvr>
+</p:sld>
+</file>
+
+<file path=ppt/slides/slide3.xml><?xml version="1.0" encoding="utf-8"?>
+<p:sld xmlns:a="http://schemas.openxmlformats.org/drawingml/2006/main" xmlns:r="http://schemas.openxmlformats.org/officeDocument/2006/relationships" xmlns:p="http://schemas.openxmlformats.org/presentationml/2006/main">
+  <p:cSld>
+    <p:spTree>
+      <p:nvGrpSpPr>
+        <p:cNvPr id="1" name="">
+          <a:extLst>
+            <a:ext uri="{FF2B5EF4-FFF2-40B4-BE49-F238E27FC236}">
+              <a16:creationId xmlns:a16="http://schemas.microsoft.com/office/drawing/2014/main" id="{62153D92-C494-7239-2B9C-4A0DFC3AEB3F}"/>
+            </a:ext>
+          </a:extLst>
+        </p:cNvPr>
+        <p:cNvGrpSpPr/>
+        <p:nvPr/>
+      </p:nvGrpSpPr>
+      <p:grpSpPr>
+        <a:xfrm>
+          <a:off x="0" y="0"/>
+          <a:ext cx="0" cy="0"/>
+          <a:chOff x="0" y="0"/>
+          <a:chExt cx="0" cy="0"/>
+        </a:xfrm>
+      </p:grpSpPr>
+      <p:pic>
+        <p:nvPicPr>
+          <p:cNvPr id="3" name="Imagen 2">
+            <a:extLst>
+              <a:ext uri="{FF2B5EF4-FFF2-40B4-BE49-F238E27FC236}">
+                <a16:creationId xmlns:a16="http://schemas.microsoft.com/office/drawing/2014/main" id="{CA4E83A6-2E9A-C9DB-D3EA-705C6F93CB09}"/>
+              </a:ext>
+            </a:extLst>
+          </p:cNvPr>
+          <p:cNvPicPr>
+            <a:picLocks noChangeAspect="1"/>
+          </p:cNvPicPr>
+          <p:nvPr/>
+        </p:nvPicPr>
+        <p:blipFill>
+          <a:blip r:embed="rId2"/>
+          <a:srcRect b="54275"/>
+          <a:stretch>
+            <a:fillRect/>
+          </a:stretch>
+        </p:blipFill>
+        <p:spPr>
+          <a:xfrm>
+            <a:off x="1564726" y="1498600"/>
+            <a:ext cx="7086600" cy="1173018"/>
+          </a:xfrm>
+          <a:prstGeom prst="rect">
+            <a:avLst/>
+          </a:prstGeom>
+        </p:spPr>
+      </p:pic>
+      <p:pic>
+        <p:nvPicPr>
+          <p:cNvPr id="9" name="Imagen 8" descr="Interfaz de usuario gráfica, Aplicación&#10;&#10;El contenido generado por IA puede ser incorrecto.">
+            <a:extLst>
+              <a:ext uri="{FF2B5EF4-FFF2-40B4-BE49-F238E27FC236}">
+                <a16:creationId xmlns:a16="http://schemas.microsoft.com/office/drawing/2014/main" id="{14FE5255-97FF-4E09-7E43-3DF8947BC765}"/>
+              </a:ext>
+            </a:extLst>
+          </p:cNvPr>
+          <p:cNvPicPr>
+            <a:picLocks noChangeAspect="1"/>
+          </p:cNvPicPr>
+          <p:nvPr/>
+        </p:nvPicPr>
+        <p:blipFill>
+          <a:blip r:embed="rId3"/>
+          <a:stretch>
+            <a:fillRect/>
+          </a:stretch>
+        </p:blipFill>
+        <p:spPr>
+          <a:xfrm>
+            <a:off x="1564726" y="3913909"/>
+            <a:ext cx="9466703" cy="1808018"/>
+          </a:xfrm>
+          <a:prstGeom prst="rect">
+            <a:avLst/>
+          </a:prstGeom>
+        </p:spPr>
+      </p:pic>
+      <p:sp>
+        <p:nvSpPr>
+          <p:cNvPr id="10" name="CuadroTexto 9">
+            <a:extLst>
+              <a:ext uri="{FF2B5EF4-FFF2-40B4-BE49-F238E27FC236}">
+                <a16:creationId xmlns:a16="http://schemas.microsoft.com/office/drawing/2014/main" id="{0CE6B9E0-2B0C-43C9-3308-3D299AF36537}"/>
               </a:ext>
             </a:extLst>
           </p:cNvPr>
@@ -3476,8 +3583,8 @@
         </p:nvSpPr>
         <p:spPr>
           <a:xfrm>
-            <a:off x="8260773" y="1060304"/>
-            <a:ext cx="2493818" cy="3416320"/>
+            <a:off x="1564726" y="951407"/>
+            <a:ext cx="7260619" cy="369332"/>
           </a:xfrm>
           <a:prstGeom prst="rect">
             <a:avLst/>
@@ -3492,7 +3599,7 @@
           <a:p>
             <a:r>
               <a:rPr lang="es-ES" dirty="0"/>
-              <a:t>Sigue habiendo un montón de espacio en blanco. Y los textos tienes que ser los siguientes, en una primera línea, en negrita, “Calidad del aire en Gijón”, y en una segunda línea “Consulta los datos de PM2.5 de la estación en Av. Constitución”</a:t>
+              <a:t>Botones antes de dar de alta usuario</a:t>
             </a:r>
           </a:p>
         </p:txBody>
@@ -3502,7 +3609,7 @@
           <p:cNvPr id="11" name="CuadroTexto 10">
             <a:extLst>
               <a:ext uri="{FF2B5EF4-FFF2-40B4-BE49-F238E27FC236}">
-                <a16:creationId xmlns:a16="http://schemas.microsoft.com/office/drawing/2014/main" id="{C3CBF45D-4657-5F1B-199F-A2425326B1F7}"/>
+                <a16:creationId xmlns:a16="http://schemas.microsoft.com/office/drawing/2014/main" id="{E7125C2E-B6DB-4811-7DAB-E8A695E65D83}"/>
               </a:ext>
             </a:extLst>
           </p:cNvPr>
@@ -3511,8 +3618,8 @@
         </p:nvSpPr>
         <p:spPr>
           <a:xfrm>
-            <a:off x="598429" y="2505670"/>
-            <a:ext cx="6099462" cy="923330"/>
+            <a:off x="1675562" y="3244334"/>
+            <a:ext cx="7260619" cy="369332"/>
           </a:xfrm>
           <a:prstGeom prst="rect">
             <a:avLst/>
@@ -3520,22 +3627,520 @@
           <a:noFill/>
         </p:spPr>
         <p:txBody>
-          <a:bodyPr wrap="square">
+          <a:bodyPr wrap="square" rtlCol="0">
             <a:spAutoFit/>
           </a:bodyPr>
           <a:lstStyle/>
           <a:p>
             <a:r>
               <a:rPr lang="es-ES" dirty="0"/>
-              <a:t>“Calidad del aire en Gijón”, y en una segunda línea “Consulta los datos de PM2.5 de la estación en Av. Constitución”</a:t>
-            </a:r>
+              <a:t>Botones después de dar de alta usuario </a:t>
+            </a:r>
+          </a:p>
+        </p:txBody>
+      </p:sp>
+      <p:sp>
+        <p:nvSpPr>
+          <p:cNvPr id="12" name="Rectángulo 11">
+            <a:extLst>
+              <a:ext uri="{FF2B5EF4-FFF2-40B4-BE49-F238E27FC236}">
+                <a16:creationId xmlns:a16="http://schemas.microsoft.com/office/drawing/2014/main" id="{5B4A82CE-C2DD-79C1-EF4E-21E2E98872E5}"/>
+              </a:ext>
+            </a:extLst>
+          </p:cNvPr>
+          <p:cNvSpPr/>
+          <p:nvPr/>
+        </p:nvSpPr>
+        <p:spPr>
+          <a:xfrm>
+            <a:off x="6298077" y="1498600"/>
+            <a:ext cx="2353249" cy="1173018"/>
+          </a:xfrm>
+          <a:prstGeom prst="rect">
+            <a:avLst/>
+          </a:prstGeom>
+          <a:noFill/>
+          <a:ln>
+            <a:solidFill>
+              <a:srgbClr val="FF0000"/>
+            </a:solidFill>
+          </a:ln>
+        </p:spPr>
+        <p:style>
+          <a:lnRef idx="2">
+            <a:schemeClr val="accent1">
+              <a:shade val="15000"/>
+            </a:schemeClr>
+          </a:lnRef>
+          <a:fillRef idx="1">
+            <a:schemeClr val="accent1"/>
+          </a:fillRef>
+          <a:effectRef idx="0">
+            <a:schemeClr val="accent1"/>
+          </a:effectRef>
+          <a:fontRef idx="minor">
+            <a:schemeClr val="lt1"/>
+          </a:fontRef>
+        </p:style>
+        <p:txBody>
+          <a:bodyPr rtlCol="0" anchor="ctr"/>
+          <a:lstStyle/>
+          <a:p>
+            <a:pPr algn="ctr"/>
+            <a:endParaRPr lang="es-ES"/>
+          </a:p>
+        </p:txBody>
+      </p:sp>
+      <p:sp>
+        <p:nvSpPr>
+          <p:cNvPr id="13" name="Rectángulo 12">
+            <a:extLst>
+              <a:ext uri="{FF2B5EF4-FFF2-40B4-BE49-F238E27FC236}">
+                <a16:creationId xmlns:a16="http://schemas.microsoft.com/office/drawing/2014/main" id="{16D772BF-ADD7-C834-E494-29DCF680F972}"/>
+              </a:ext>
+            </a:extLst>
+          </p:cNvPr>
+          <p:cNvSpPr/>
+          <p:nvPr/>
+        </p:nvSpPr>
+        <p:spPr>
+          <a:xfrm>
+            <a:off x="5127542" y="3865418"/>
+            <a:ext cx="1591913" cy="1173018"/>
+          </a:xfrm>
+          <a:prstGeom prst="rect">
+            <a:avLst/>
+          </a:prstGeom>
+          <a:noFill/>
+          <a:ln>
+            <a:solidFill>
+              <a:srgbClr val="FF0000"/>
+            </a:solidFill>
+          </a:ln>
+        </p:spPr>
+        <p:style>
+          <a:lnRef idx="2">
+            <a:schemeClr val="accent1">
+              <a:shade val="15000"/>
+            </a:schemeClr>
+          </a:lnRef>
+          <a:fillRef idx="1">
+            <a:schemeClr val="accent1"/>
+          </a:fillRef>
+          <a:effectRef idx="0">
+            <a:schemeClr val="accent1"/>
+          </a:effectRef>
+          <a:fontRef idx="minor">
+            <a:schemeClr val="lt1"/>
+          </a:fontRef>
+        </p:style>
+        <p:txBody>
+          <a:bodyPr rtlCol="0" anchor="ctr"/>
+          <a:lstStyle/>
+          <a:p>
+            <a:pPr algn="ctr"/>
+            <a:endParaRPr lang="es-ES"/>
+          </a:p>
+        </p:txBody>
+      </p:sp>
+      <p:sp>
+        <p:nvSpPr>
+          <p:cNvPr id="14" name="Rectángulo 13">
+            <a:extLst>
+              <a:ext uri="{FF2B5EF4-FFF2-40B4-BE49-F238E27FC236}">
+                <a16:creationId xmlns:a16="http://schemas.microsoft.com/office/drawing/2014/main" id="{AB09563D-B16D-44A3-EDDF-FB8D3A3848AA}"/>
+              </a:ext>
+            </a:extLst>
+          </p:cNvPr>
+          <p:cNvSpPr/>
+          <p:nvPr/>
+        </p:nvSpPr>
+        <p:spPr>
+          <a:xfrm>
+            <a:off x="8140731" y="3865418"/>
+            <a:ext cx="2353249" cy="1173018"/>
+          </a:xfrm>
+          <a:prstGeom prst="rect">
+            <a:avLst/>
+          </a:prstGeom>
+          <a:noFill/>
+          <a:ln>
+            <a:solidFill>
+              <a:srgbClr val="FF0000"/>
+            </a:solidFill>
+          </a:ln>
+        </p:spPr>
+        <p:style>
+          <a:lnRef idx="2">
+            <a:schemeClr val="accent1">
+              <a:shade val="15000"/>
+            </a:schemeClr>
+          </a:lnRef>
+          <a:fillRef idx="1">
+            <a:schemeClr val="accent1"/>
+          </a:fillRef>
+          <a:effectRef idx="0">
+            <a:schemeClr val="accent1"/>
+          </a:effectRef>
+          <a:fontRef idx="minor">
+            <a:schemeClr val="lt1"/>
+          </a:fontRef>
+        </p:style>
+        <p:txBody>
+          <a:bodyPr rtlCol="0" anchor="ctr"/>
+          <a:lstStyle/>
+          <a:p>
+            <a:pPr algn="ctr"/>
+            <a:endParaRPr lang="es-ES"/>
           </a:p>
         </p:txBody>
       </p:sp>
     </p:spTree>
     <p:extLst>
       <p:ext uri="{BB962C8B-B14F-4D97-AF65-F5344CB8AC3E}">
-        <p14:creationId xmlns:p14="http://schemas.microsoft.com/office/powerpoint/2010/main" val="1753184298"/>
+        <p14:creationId xmlns:p14="http://schemas.microsoft.com/office/powerpoint/2010/main" val="4098454178"/>
+      </p:ext>
+    </p:extLst>
+  </p:cSld>
+  <p:clrMapOvr>
+    <a:masterClrMapping/>
+  </p:clrMapOvr>
+</p:sld>
+</file>
+
+<file path=ppt/slides/slide4.xml><?xml version="1.0" encoding="utf-8"?>
+<p:sld xmlns:a="http://schemas.openxmlformats.org/drawingml/2006/main" xmlns:r="http://schemas.openxmlformats.org/officeDocument/2006/relationships" xmlns:p="http://schemas.openxmlformats.org/presentationml/2006/main">
+  <p:cSld>
+    <p:spTree>
+      <p:nvGrpSpPr>
+        <p:cNvPr id="1" name="">
+          <a:extLst>
+            <a:ext uri="{FF2B5EF4-FFF2-40B4-BE49-F238E27FC236}">
+              <a16:creationId xmlns:a16="http://schemas.microsoft.com/office/drawing/2014/main" id="{21462867-3AB7-D164-FF75-CEC6860B4579}"/>
+            </a:ext>
+          </a:extLst>
+        </p:cNvPr>
+        <p:cNvGrpSpPr/>
+        <p:nvPr/>
+      </p:nvGrpSpPr>
+      <p:grpSpPr>
+        <a:xfrm>
+          <a:off x="0" y="0"/>
+          <a:ext cx="0" cy="0"/>
+          <a:chOff x="0" y="0"/>
+          <a:chExt cx="0" cy="0"/>
+        </a:xfrm>
+      </p:grpSpPr>
+      <p:sp>
+        <p:nvSpPr>
+          <p:cNvPr id="10" name="CuadroTexto 9">
+            <a:extLst>
+              <a:ext uri="{FF2B5EF4-FFF2-40B4-BE49-F238E27FC236}">
+                <a16:creationId xmlns:a16="http://schemas.microsoft.com/office/drawing/2014/main" id="{7A693D86-A877-E5BC-7314-7173E8025BB6}"/>
+              </a:ext>
+            </a:extLst>
+          </p:cNvPr>
+          <p:cNvSpPr txBox="1"/>
+          <p:nvPr/>
+        </p:nvSpPr>
+        <p:spPr>
+          <a:xfrm>
+            <a:off x="1564726" y="951407"/>
+            <a:ext cx="7260619" cy="369332"/>
+          </a:xfrm>
+          <a:prstGeom prst="rect">
+            <a:avLst/>
+          </a:prstGeom>
+          <a:noFill/>
+        </p:spPr>
+        <p:txBody>
+          <a:bodyPr wrap="square" rtlCol="0">
+            <a:spAutoFit/>
+          </a:bodyPr>
+          <a:lstStyle/>
+          <a:p>
+            <a:r>
+              <a:rPr lang="es-ES" dirty="0"/>
+              <a:t>Hay que mejorar este formato</a:t>
+            </a:r>
+          </a:p>
+        </p:txBody>
+      </p:sp>
+      <p:pic>
+        <p:nvPicPr>
+          <p:cNvPr id="5" name="Imagen 4" descr="Interfaz de usuario gráfica, Texto, Aplicación&#10;&#10;El contenido generado por IA puede ser incorrecto.">
+            <a:extLst>
+              <a:ext uri="{FF2B5EF4-FFF2-40B4-BE49-F238E27FC236}">
+                <a16:creationId xmlns:a16="http://schemas.microsoft.com/office/drawing/2014/main" id="{EF8423E9-A885-4670-9D84-6D46F7AFDF8D}"/>
+              </a:ext>
+            </a:extLst>
+          </p:cNvPr>
+          <p:cNvPicPr>
+            <a:picLocks noChangeAspect="1"/>
+          </p:cNvPicPr>
+          <p:nvPr/>
+        </p:nvPicPr>
+        <p:blipFill>
+          <a:blip r:embed="rId2"/>
+          <a:stretch>
+            <a:fillRect/>
+          </a:stretch>
+        </p:blipFill>
+        <p:spPr>
+          <a:xfrm>
+            <a:off x="1473200" y="1652155"/>
+            <a:ext cx="4622800" cy="2057400"/>
+          </a:xfrm>
+          <a:prstGeom prst="rect">
+            <a:avLst/>
+          </a:prstGeom>
+        </p:spPr>
+      </p:pic>
+    </p:spTree>
+    <p:extLst>
+      <p:ext uri="{BB962C8B-B14F-4D97-AF65-F5344CB8AC3E}">
+        <p14:creationId xmlns:p14="http://schemas.microsoft.com/office/powerpoint/2010/main" val="3448077080"/>
+      </p:ext>
+    </p:extLst>
+  </p:cSld>
+  <p:clrMapOvr>
+    <a:masterClrMapping/>
+  </p:clrMapOvr>
+</p:sld>
+</file>
+
+<file path=ppt/slides/slide5.xml><?xml version="1.0" encoding="utf-8"?>
+<p:sld xmlns:a="http://schemas.openxmlformats.org/drawingml/2006/main" xmlns:r="http://schemas.openxmlformats.org/officeDocument/2006/relationships" xmlns:p="http://schemas.openxmlformats.org/presentationml/2006/main">
+  <p:cSld>
+    <p:spTree>
+      <p:nvGrpSpPr>
+        <p:cNvPr id="1" name="">
+          <a:extLst>
+            <a:ext uri="{FF2B5EF4-FFF2-40B4-BE49-F238E27FC236}">
+              <a16:creationId xmlns:a16="http://schemas.microsoft.com/office/drawing/2014/main" id="{357553B1-58A7-AF07-7FA9-E52FE415352E}"/>
+            </a:ext>
+          </a:extLst>
+        </p:cNvPr>
+        <p:cNvGrpSpPr/>
+        <p:nvPr/>
+      </p:nvGrpSpPr>
+      <p:grpSpPr>
+        <a:xfrm>
+          <a:off x="0" y="0"/>
+          <a:ext cx="0" cy="0"/>
+          <a:chOff x="0" y="0"/>
+          <a:chExt cx="0" cy="0"/>
+        </a:xfrm>
+      </p:grpSpPr>
+      <p:sp>
+        <p:nvSpPr>
+          <p:cNvPr id="10" name="CuadroTexto 9">
+            <a:extLst>
+              <a:ext uri="{FF2B5EF4-FFF2-40B4-BE49-F238E27FC236}">
+                <a16:creationId xmlns:a16="http://schemas.microsoft.com/office/drawing/2014/main" id="{69306898-79EE-BC0F-F4FC-E29509149F67}"/>
+              </a:ext>
+            </a:extLst>
+          </p:cNvPr>
+          <p:cNvSpPr txBox="1"/>
+          <p:nvPr/>
+        </p:nvSpPr>
+        <p:spPr>
+          <a:xfrm>
+            <a:off x="1786399" y="743589"/>
+            <a:ext cx="7260619" cy="1200329"/>
+          </a:xfrm>
+          <a:prstGeom prst="rect">
+            <a:avLst/>
+          </a:prstGeom>
+          <a:noFill/>
+        </p:spPr>
+        <p:txBody>
+          <a:bodyPr wrap="square" rtlCol="0">
+            <a:spAutoFit/>
+          </a:bodyPr>
+          <a:lstStyle/>
+          <a:p>
+            <a:r>
+              <a:rPr lang="es-ES" dirty="0"/>
+              <a:t>En el e-mail de bienvenida está mal el enlace a la web.</a:t>
+            </a:r>
+          </a:p>
+          <a:p>
+            <a:endParaRPr lang="es-ES" dirty="0"/>
+          </a:p>
+          <a:p>
+            <a:r>
+              <a:rPr lang="es-ES" dirty="0"/>
+              <a:t>Aparece este: </a:t>
+            </a:r>
+            <a:r>
+              <a:rPr lang="es-ES" dirty="0">
+                <a:hlinkClick r:id="rId2"/>
+              </a:rPr>
+              <a:t>https://air-gijon-frontend.onrender.com/</a:t>
+            </a:r>
+            <a:endParaRPr lang="es-ES" dirty="0"/>
+          </a:p>
+          <a:p>
+            <a:r>
+              <a:rPr lang="es-ES" dirty="0"/>
+              <a:t>Y tendría que ser este: https://air-</a:t>
+            </a:r>
+            <a:r>
+              <a:rPr lang="es-ES" dirty="0" err="1"/>
+              <a:t>gijon</a:t>
+            </a:r>
+            <a:r>
+              <a:rPr lang="es-ES" dirty="0"/>
+              <a:t>-</a:t>
+            </a:r>
+            <a:r>
+              <a:rPr lang="es-ES" dirty="0" err="1"/>
+              <a:t>front-end.onrender.com</a:t>
+            </a:r>
+            <a:r>
+              <a:rPr lang="es-ES" dirty="0"/>
+              <a:t>/</a:t>
+            </a:r>
+          </a:p>
+        </p:txBody>
+      </p:sp>
+    </p:spTree>
+    <p:extLst>
+      <p:ext uri="{BB962C8B-B14F-4D97-AF65-F5344CB8AC3E}">
+        <p14:creationId xmlns:p14="http://schemas.microsoft.com/office/powerpoint/2010/main" val="3937038729"/>
+      </p:ext>
+    </p:extLst>
+  </p:cSld>
+  <p:clrMapOvr>
+    <a:masterClrMapping/>
+  </p:clrMapOvr>
+</p:sld>
+</file>
+
+<file path=ppt/slides/slide6.xml><?xml version="1.0" encoding="utf-8"?>
+<p:sld xmlns:a="http://schemas.openxmlformats.org/drawingml/2006/main" xmlns:r="http://schemas.openxmlformats.org/officeDocument/2006/relationships" xmlns:p="http://schemas.openxmlformats.org/presentationml/2006/main">
+  <p:cSld>
+    <p:spTree>
+      <p:nvGrpSpPr>
+        <p:cNvPr id="1" name="">
+          <a:extLst>
+            <a:ext uri="{FF2B5EF4-FFF2-40B4-BE49-F238E27FC236}">
+              <a16:creationId xmlns:a16="http://schemas.microsoft.com/office/drawing/2014/main" id="{DDA46F66-49DC-7F50-42A6-3436A2A48BDD}"/>
+            </a:ext>
+          </a:extLst>
+        </p:cNvPr>
+        <p:cNvGrpSpPr/>
+        <p:nvPr/>
+      </p:nvGrpSpPr>
+      <p:grpSpPr>
+        <a:xfrm>
+          <a:off x="0" y="0"/>
+          <a:ext cx="0" cy="0"/>
+          <a:chOff x="0" y="0"/>
+          <a:chExt cx="0" cy="0"/>
+        </a:xfrm>
+      </p:grpSpPr>
+      <p:pic>
+        <p:nvPicPr>
+          <p:cNvPr id="3" name="Imagen 2" descr="Interfaz de usuario gráfica, Aplicación&#10;&#10;El contenido generado por IA puede ser incorrecto.">
+            <a:extLst>
+              <a:ext uri="{FF2B5EF4-FFF2-40B4-BE49-F238E27FC236}">
+                <a16:creationId xmlns:a16="http://schemas.microsoft.com/office/drawing/2014/main" id="{8E3893B5-3561-769B-D8DE-28418112C726}"/>
+              </a:ext>
+            </a:extLst>
+          </p:cNvPr>
+          <p:cNvPicPr>
+            <a:picLocks noChangeAspect="1"/>
+          </p:cNvPicPr>
+          <p:nvPr/>
+        </p:nvPicPr>
+        <p:blipFill>
+          <a:blip r:embed="rId2"/>
+          <a:stretch>
+            <a:fillRect/>
+          </a:stretch>
+        </p:blipFill>
+        <p:spPr>
+          <a:xfrm>
+            <a:off x="1458768" y="1467427"/>
+            <a:ext cx="7772400" cy="2479205"/>
+          </a:xfrm>
+          <a:prstGeom prst="rect">
+            <a:avLst/>
+          </a:prstGeom>
+        </p:spPr>
+      </p:pic>
+    </p:spTree>
+    <p:extLst>
+      <p:ext uri="{BB962C8B-B14F-4D97-AF65-F5344CB8AC3E}">
+        <p14:creationId xmlns:p14="http://schemas.microsoft.com/office/powerpoint/2010/main" val="2941526077"/>
+      </p:ext>
+    </p:extLst>
+  </p:cSld>
+  <p:clrMapOvr>
+    <a:masterClrMapping/>
+  </p:clrMapOvr>
+</p:sld>
+</file>
+
+<file path=ppt/slides/slide7.xml><?xml version="1.0" encoding="utf-8"?>
+<p:sld xmlns:a="http://schemas.openxmlformats.org/drawingml/2006/main" xmlns:r="http://schemas.openxmlformats.org/officeDocument/2006/relationships" xmlns:p="http://schemas.openxmlformats.org/presentationml/2006/main">
+  <p:cSld>
+    <p:spTree>
+      <p:nvGrpSpPr>
+        <p:cNvPr id="1" name="">
+          <a:extLst>
+            <a:ext uri="{FF2B5EF4-FFF2-40B4-BE49-F238E27FC236}">
+              <a16:creationId xmlns:a16="http://schemas.microsoft.com/office/drawing/2014/main" id="{C590A3FC-F786-BDFF-DE69-9D8841378355}"/>
+            </a:ext>
+          </a:extLst>
+        </p:cNvPr>
+        <p:cNvGrpSpPr/>
+        <p:nvPr/>
+      </p:nvGrpSpPr>
+      <p:grpSpPr>
+        <a:xfrm>
+          <a:off x="0" y="0"/>
+          <a:ext cx="0" cy="0"/>
+          <a:chOff x="0" y="0"/>
+          <a:chExt cx="0" cy="0"/>
+        </a:xfrm>
+      </p:grpSpPr>
+      <p:pic>
+        <p:nvPicPr>
+          <p:cNvPr id="4" name="Imagen 3" descr="Interfaz de usuario gráfica, Aplicación, Teams&#10;&#10;El contenido generado por IA puede ser incorrecto.">
+            <a:extLst>
+              <a:ext uri="{FF2B5EF4-FFF2-40B4-BE49-F238E27FC236}">
+                <a16:creationId xmlns:a16="http://schemas.microsoft.com/office/drawing/2014/main" id="{F959E73C-4269-6422-4169-C9157F218F20}"/>
+              </a:ext>
+            </a:extLst>
+          </p:cNvPr>
+          <p:cNvPicPr>
+            <a:picLocks noChangeAspect="1"/>
+          </p:cNvPicPr>
+          <p:nvPr/>
+        </p:nvPicPr>
+        <p:blipFill>
+          <a:blip r:embed="rId2"/>
+          <a:stretch>
+            <a:fillRect/>
+          </a:stretch>
+        </p:blipFill>
+        <p:spPr>
+          <a:xfrm>
+            <a:off x="2970955" y="0"/>
+            <a:ext cx="6250089" cy="6858000"/>
+          </a:xfrm>
+          <a:prstGeom prst="rect">
+            <a:avLst/>
+          </a:prstGeom>
+        </p:spPr>
+      </p:pic>
+    </p:spTree>
+    <p:extLst>
+      <p:ext uri="{BB962C8B-B14F-4D97-AF65-F5344CB8AC3E}">
+        <p14:creationId xmlns:p14="http://schemas.microsoft.com/office/powerpoint/2010/main" val="3287038178"/>
       </p:ext>
     </p:extLst>
   </p:cSld>

</xml_diff>